<commit_message>
https://jira.hl7.org/browse/FHIR-40793 - Added participants into physical activity cycle diagram
</commit_message>
<xml_diff>
--- a/input/images-source/Physical Activity cycle.pptx
+++ b/input/images-source/Physical Activity cycle.pptx
@@ -104,6 +104,11 @@
       </a:defRPr>
     </a:lvl9pPr>
   </p:defaultTextStyle>
+  <p:extLst>
+    <p:ext uri="{EFAFB233-063F-42B5-8137-9DF3F51BA10A}">
+      <p15:sldGuideLst xmlns:p15="http://schemas.microsoft.com/office/powerpoint/2012/main"/>
+    </p:ext>
+  </p:extLst>
 </p:presentation>
 </file>
 
@@ -238,7 +243,7 @@
           <a:p>
             <a:fld id="{8AA46122-674A-4A65-A21B-33F6F155720A}" type="datetimeFigureOut">
               <a:rPr lang="en-CA" smtClean="0"/>
-              <a:t>2023-02-04</a:t>
+              <a:t>2023-03-31</a:t>
             </a:fld>
             <a:endParaRPr lang="en-CA"/>
           </a:p>
@@ -408,7 +413,7 @@
           <a:p>
             <a:fld id="{8AA46122-674A-4A65-A21B-33F6F155720A}" type="datetimeFigureOut">
               <a:rPr lang="en-CA" smtClean="0"/>
-              <a:t>2023-02-04</a:t>
+              <a:t>2023-03-31</a:t>
             </a:fld>
             <a:endParaRPr lang="en-CA"/>
           </a:p>
@@ -588,7 +593,7 @@
           <a:p>
             <a:fld id="{8AA46122-674A-4A65-A21B-33F6F155720A}" type="datetimeFigureOut">
               <a:rPr lang="en-CA" smtClean="0"/>
-              <a:t>2023-02-04</a:t>
+              <a:t>2023-03-31</a:t>
             </a:fld>
             <a:endParaRPr lang="en-CA"/>
           </a:p>
@@ -758,7 +763,7 @@
           <a:p>
             <a:fld id="{8AA46122-674A-4A65-A21B-33F6F155720A}" type="datetimeFigureOut">
               <a:rPr lang="en-CA" smtClean="0"/>
-              <a:t>2023-02-04</a:t>
+              <a:t>2023-03-31</a:t>
             </a:fld>
             <a:endParaRPr lang="en-CA"/>
           </a:p>
@@ -1004,7 +1009,7 @@
           <a:p>
             <a:fld id="{8AA46122-674A-4A65-A21B-33F6F155720A}" type="datetimeFigureOut">
               <a:rPr lang="en-CA" smtClean="0"/>
-              <a:t>2023-02-04</a:t>
+              <a:t>2023-03-31</a:t>
             </a:fld>
             <a:endParaRPr lang="en-CA"/>
           </a:p>
@@ -1236,7 +1241,7 @@
           <a:p>
             <a:fld id="{8AA46122-674A-4A65-A21B-33F6F155720A}" type="datetimeFigureOut">
               <a:rPr lang="en-CA" smtClean="0"/>
-              <a:t>2023-02-04</a:t>
+              <a:t>2023-03-31</a:t>
             </a:fld>
             <a:endParaRPr lang="en-CA"/>
           </a:p>
@@ -1603,7 +1608,7 @@
           <a:p>
             <a:fld id="{8AA46122-674A-4A65-A21B-33F6F155720A}" type="datetimeFigureOut">
               <a:rPr lang="en-CA" smtClean="0"/>
-              <a:t>2023-02-04</a:t>
+              <a:t>2023-03-31</a:t>
             </a:fld>
             <a:endParaRPr lang="en-CA"/>
           </a:p>
@@ -1721,7 +1726,7 @@
           <a:p>
             <a:fld id="{8AA46122-674A-4A65-A21B-33F6F155720A}" type="datetimeFigureOut">
               <a:rPr lang="en-CA" smtClean="0"/>
-              <a:t>2023-02-04</a:t>
+              <a:t>2023-03-31</a:t>
             </a:fld>
             <a:endParaRPr lang="en-CA"/>
           </a:p>
@@ -1816,7 +1821,7 @@
           <a:p>
             <a:fld id="{8AA46122-674A-4A65-A21B-33F6F155720A}" type="datetimeFigureOut">
               <a:rPr lang="en-CA" smtClean="0"/>
-              <a:t>2023-02-04</a:t>
+              <a:t>2023-03-31</a:t>
             </a:fld>
             <a:endParaRPr lang="en-CA"/>
           </a:p>
@@ -2093,7 +2098,7 @@
           <a:p>
             <a:fld id="{8AA46122-674A-4A65-A21B-33F6F155720A}" type="datetimeFigureOut">
               <a:rPr lang="en-CA" smtClean="0"/>
-              <a:t>2023-02-04</a:t>
+              <a:t>2023-03-31</a:t>
             </a:fld>
             <a:endParaRPr lang="en-CA"/>
           </a:p>
@@ -2350,7 +2355,7 @@
           <a:p>
             <a:fld id="{8AA46122-674A-4A65-A21B-33F6F155720A}" type="datetimeFigureOut">
               <a:rPr lang="en-CA" smtClean="0"/>
-              <a:t>2023-02-04</a:t>
+              <a:t>2023-03-31</a:t>
             </a:fld>
             <a:endParaRPr lang="en-CA"/>
           </a:p>
@@ -2563,7 +2568,7 @@
           <a:p>
             <a:fld id="{8AA46122-674A-4A65-A21B-33F6F155720A}" type="datetimeFigureOut">
               <a:rPr lang="en-CA" smtClean="0"/>
-              <a:t>2023-02-04</a:t>
+              <a:t>2023-03-31</a:t>
             </a:fld>
             <a:endParaRPr lang="en-CA"/>
           </a:p>
@@ -3968,47 +3973,361 @@
             </a:p>
           </p:txBody>
         </p:sp>
-        <p:sp>
-          <p:nvSpPr>
-            <p:cNvPr id="1083" name="TextBox 1082">
-              <a:extLst>
-                <a:ext uri="{FF2B5EF4-FFF2-40B4-BE49-F238E27FC236}">
-                  <a16:creationId xmlns:a16="http://schemas.microsoft.com/office/drawing/2014/main" id="{C1B7E51C-7668-A74E-6DA2-491E6C890138}"/>
-                </a:ext>
-              </a:extLst>
-            </p:cNvPr>
-            <p:cNvSpPr txBox="1"/>
-            <p:nvPr/>
-          </p:nvSpPr>
-          <p:spPr>
-            <a:xfrm>
-              <a:off x="5499718" y="3252976"/>
-              <a:ext cx="908929" cy="615874"/>
-            </a:xfrm>
-            <a:prstGeom prst="rect">
-              <a:avLst/>
-            </a:prstGeom>
-            <a:noFill/>
-          </p:spPr>
-          <p:txBody>
-            <a:bodyPr wrap="square" rtlCol="0">
-              <a:spAutoFit/>
-            </a:bodyPr>
-            <a:lstStyle/>
-            <a:p>
-              <a:pPr algn="ctr"/>
-              <a:r>
-                <a:rPr lang="en-CA" sz="1801" b="1" dirty="0">
-                  <a:solidFill>
-                    <a:schemeClr val="accent2"/>
-                  </a:solidFill>
-                </a:rPr>
-                <a:t>Improving Physical Activity</a:t>
-              </a:r>
-            </a:p>
-          </p:txBody>
-        </p:sp>
       </p:grpSp>
+      <p:pic>
+        <p:nvPicPr>
+          <p:cNvPr id="3" name="Picture 2" descr="A person lifting weights&#10;&#10;Description automatically generated with medium confidence">
+            <a:extLst>
+              <a:ext uri="{FF2B5EF4-FFF2-40B4-BE49-F238E27FC236}">
+                <a16:creationId xmlns:a16="http://schemas.microsoft.com/office/drawing/2014/main" id="{17CBD637-E99D-4F81-F97C-EB6337889269}"/>
+              </a:ext>
+            </a:extLst>
+          </p:cNvPr>
+          <p:cNvPicPr>
+            <a:picLocks noChangeAspect="1"/>
+          </p:cNvPicPr>
+          <p:nvPr/>
+        </p:nvPicPr>
+        <p:blipFill>
+          <a:blip r:embed="rId13">
+            <a:extLst>
+              <a:ext uri="{28A0092B-C50C-407E-A947-70E740481C1C}">
+                <a14:useLocalDpi xmlns:a14="http://schemas.microsoft.com/office/drawing/2010/main" val="0"/>
+              </a:ext>
+            </a:extLst>
+          </a:blip>
+          <a:stretch>
+            <a:fillRect/>
+          </a:stretch>
+        </p:blipFill>
+        <p:spPr>
+          <a:xfrm>
+            <a:off x="3031138" y="1761130"/>
+            <a:ext cx="592615" cy="592615"/>
+          </a:xfrm>
+          <a:prstGeom prst="rect">
+            <a:avLst/>
+          </a:prstGeom>
+        </p:spPr>
+      </p:pic>
+      <p:pic>
+        <p:nvPicPr>
+          <p:cNvPr id="5" name="Picture 4" descr="A close-up of a light bulb&#10;&#10;Description automatically generated with low confidence">
+            <a:extLst>
+              <a:ext uri="{FF2B5EF4-FFF2-40B4-BE49-F238E27FC236}">
+                <a16:creationId xmlns:a16="http://schemas.microsoft.com/office/drawing/2014/main" id="{7FCF262F-9D45-153A-F442-5F18F62DC447}"/>
+              </a:ext>
+            </a:extLst>
+          </p:cNvPr>
+          <p:cNvPicPr>
+            <a:picLocks noChangeAspect="1"/>
+          </p:cNvPicPr>
+          <p:nvPr/>
+        </p:nvPicPr>
+        <p:blipFill>
+          <a:blip r:embed="rId14">
+            <a:extLst>
+              <a:ext uri="{28A0092B-C50C-407E-A947-70E740481C1C}">
+                <a14:useLocalDpi xmlns:a14="http://schemas.microsoft.com/office/drawing/2010/main" val="0"/>
+              </a:ext>
+            </a:extLst>
+          </a:blip>
+          <a:stretch>
+            <a:fillRect/>
+          </a:stretch>
+        </p:blipFill>
+        <p:spPr>
+          <a:xfrm>
+            <a:off x="3423422" y="1061572"/>
+            <a:ext cx="588483" cy="588483"/>
+          </a:xfrm>
+          <a:prstGeom prst="rect">
+            <a:avLst/>
+          </a:prstGeom>
+        </p:spPr>
+      </p:pic>
+      <p:pic>
+        <p:nvPicPr>
+          <p:cNvPr id="7" name="Picture 6" descr="A picture containing text, clipart&#10;&#10;Description automatically generated">
+            <a:extLst>
+              <a:ext uri="{FF2B5EF4-FFF2-40B4-BE49-F238E27FC236}">
+                <a16:creationId xmlns:a16="http://schemas.microsoft.com/office/drawing/2014/main" id="{F611FFD2-20F6-2343-58FF-E0E1BE2C9227}"/>
+              </a:ext>
+            </a:extLst>
+          </p:cNvPr>
+          <p:cNvPicPr>
+            <a:picLocks noChangeAspect="1"/>
+          </p:cNvPicPr>
+          <p:nvPr/>
+        </p:nvPicPr>
+        <p:blipFill>
+          <a:blip r:embed="rId15">
+            <a:extLst>
+              <a:ext uri="{28A0092B-C50C-407E-A947-70E740481C1C}">
+                <a14:useLocalDpi xmlns:a14="http://schemas.microsoft.com/office/drawing/2010/main" val="0"/>
+              </a:ext>
+            </a:extLst>
+          </a:blip>
+          <a:stretch>
+            <a:fillRect/>
+          </a:stretch>
+        </p:blipFill>
+        <p:spPr>
+          <a:xfrm>
+            <a:off x="3835261" y="1769419"/>
+            <a:ext cx="592615" cy="592615"/>
+          </a:xfrm>
+          <a:prstGeom prst="rect">
+            <a:avLst/>
+          </a:prstGeom>
+        </p:spPr>
+      </p:pic>
+      <p:sp>
+        <p:nvSpPr>
+          <p:cNvPr id="15" name="Arrow: Left-Right 14">
+            <a:extLst>
+              <a:ext uri="{FF2B5EF4-FFF2-40B4-BE49-F238E27FC236}">
+                <a16:creationId xmlns:a16="http://schemas.microsoft.com/office/drawing/2014/main" id="{DEF1836B-A476-C0E9-68B0-5491ECCA13A5}"/>
+              </a:ext>
+            </a:extLst>
+          </p:cNvPr>
+          <p:cNvSpPr/>
+          <p:nvPr/>
+        </p:nvSpPr>
+        <p:spPr>
+          <a:xfrm rot="3641886">
+            <a:off x="3809782" y="1664726"/>
+            <a:ext cx="244107" cy="84311"/>
+          </a:xfrm>
+          <a:prstGeom prst="leftRightArrow">
+            <a:avLst/>
+          </a:prstGeom>
+        </p:spPr>
+        <p:style>
+          <a:lnRef idx="2">
+            <a:schemeClr val="accent3">
+              <a:shade val="50000"/>
+            </a:schemeClr>
+          </a:lnRef>
+          <a:fillRef idx="1">
+            <a:schemeClr val="accent3"/>
+          </a:fillRef>
+          <a:effectRef idx="0">
+            <a:schemeClr val="accent3"/>
+          </a:effectRef>
+          <a:fontRef idx="minor">
+            <a:schemeClr val="lt1"/>
+          </a:fontRef>
+        </p:style>
+        <p:txBody>
+          <a:bodyPr rtlCol="0" anchor="ctr"/>
+          <a:lstStyle/>
+          <a:p>
+            <a:pPr algn="ctr"/>
+            <a:endParaRPr lang="en-CA"/>
+          </a:p>
+        </p:txBody>
+      </p:sp>
+      <p:sp>
+        <p:nvSpPr>
+          <p:cNvPr id="28" name="Arrow: Left-Right 27">
+            <a:extLst>
+              <a:ext uri="{FF2B5EF4-FFF2-40B4-BE49-F238E27FC236}">
+                <a16:creationId xmlns:a16="http://schemas.microsoft.com/office/drawing/2014/main" id="{AD5BF4C3-DFB3-BBA9-93CD-7B1082648436}"/>
+              </a:ext>
+            </a:extLst>
+          </p:cNvPr>
+          <p:cNvSpPr/>
+          <p:nvPr/>
+        </p:nvSpPr>
+        <p:spPr>
+          <a:xfrm rot="18016755">
+            <a:off x="3397228" y="1668586"/>
+            <a:ext cx="244107" cy="84311"/>
+          </a:xfrm>
+          <a:prstGeom prst="leftRightArrow">
+            <a:avLst/>
+          </a:prstGeom>
+        </p:spPr>
+        <p:style>
+          <a:lnRef idx="2">
+            <a:schemeClr val="accent3">
+              <a:shade val="50000"/>
+            </a:schemeClr>
+          </a:lnRef>
+          <a:fillRef idx="1">
+            <a:schemeClr val="accent3"/>
+          </a:fillRef>
+          <a:effectRef idx="0">
+            <a:schemeClr val="accent3"/>
+          </a:effectRef>
+          <a:fontRef idx="minor">
+            <a:schemeClr val="lt1"/>
+          </a:fontRef>
+        </p:style>
+        <p:txBody>
+          <a:bodyPr rtlCol="0" anchor="ctr"/>
+          <a:lstStyle/>
+          <a:p>
+            <a:pPr algn="ctr"/>
+            <a:endParaRPr lang="en-CA" dirty="0"/>
+          </a:p>
+        </p:txBody>
+      </p:sp>
+      <p:sp>
+        <p:nvSpPr>
+          <p:cNvPr id="31" name="Arrow: Left-Right 30">
+            <a:extLst>
+              <a:ext uri="{FF2B5EF4-FFF2-40B4-BE49-F238E27FC236}">
+                <a16:creationId xmlns:a16="http://schemas.microsoft.com/office/drawing/2014/main" id="{85A9192A-0B43-0A7A-57DF-1ECDBF30940A}"/>
+              </a:ext>
+            </a:extLst>
+          </p:cNvPr>
+          <p:cNvSpPr/>
+          <p:nvPr/>
+        </p:nvSpPr>
+        <p:spPr>
+          <a:xfrm rot="10800000">
+            <a:off x="3604449" y="2018108"/>
+            <a:ext cx="244107" cy="84311"/>
+          </a:xfrm>
+          <a:prstGeom prst="leftRightArrow">
+            <a:avLst/>
+          </a:prstGeom>
+        </p:spPr>
+        <p:style>
+          <a:lnRef idx="2">
+            <a:schemeClr val="accent3">
+              <a:shade val="50000"/>
+            </a:schemeClr>
+          </a:lnRef>
+          <a:fillRef idx="1">
+            <a:schemeClr val="accent3"/>
+          </a:fillRef>
+          <a:effectRef idx="0">
+            <a:schemeClr val="accent3"/>
+          </a:effectRef>
+          <a:fontRef idx="minor">
+            <a:schemeClr val="lt1"/>
+          </a:fontRef>
+        </p:style>
+        <p:txBody>
+          <a:bodyPr rtlCol="0" anchor="ctr"/>
+          <a:lstStyle/>
+          <a:p>
+            <a:pPr algn="ctr"/>
+            <a:endParaRPr lang="en-CA" dirty="0"/>
+          </a:p>
+        </p:txBody>
+      </p:sp>
+      <p:sp>
+        <p:nvSpPr>
+          <p:cNvPr id="32" name="TextBox 31">
+            <a:extLst>
+              <a:ext uri="{FF2B5EF4-FFF2-40B4-BE49-F238E27FC236}">
+                <a16:creationId xmlns:a16="http://schemas.microsoft.com/office/drawing/2014/main" id="{7BF9A082-2E9E-6A23-E736-46FA38544F61}"/>
+              </a:ext>
+            </a:extLst>
+          </p:cNvPr>
+          <p:cNvSpPr txBox="1"/>
+          <p:nvPr/>
+        </p:nvSpPr>
+        <p:spPr>
+          <a:xfrm>
+            <a:off x="3249534" y="879124"/>
+            <a:ext cx="921039" cy="246221"/>
+          </a:xfrm>
+          <a:prstGeom prst="rect">
+            <a:avLst/>
+          </a:prstGeom>
+          <a:noFill/>
+        </p:spPr>
+        <p:txBody>
+          <a:bodyPr wrap="square" rtlCol="0">
+            <a:spAutoFit/>
+          </a:bodyPr>
+          <a:lstStyle/>
+          <a:p>
+            <a:r>
+              <a:rPr lang="en-CA" sz="1000" dirty="0"/>
+              <a:t>Care Manager</a:t>
+            </a:r>
+            <a:endParaRPr lang="en-CA" sz="1000" b="1" dirty="0"/>
+          </a:p>
+        </p:txBody>
+      </p:sp>
+      <p:sp>
+        <p:nvSpPr>
+          <p:cNvPr id="33" name="TextBox 32">
+            <a:extLst>
+              <a:ext uri="{FF2B5EF4-FFF2-40B4-BE49-F238E27FC236}">
+                <a16:creationId xmlns:a16="http://schemas.microsoft.com/office/drawing/2014/main" id="{196695E2-50C7-3D3B-9AED-66D2E5B641ED}"/>
+              </a:ext>
+            </a:extLst>
+          </p:cNvPr>
+          <p:cNvSpPr txBox="1"/>
+          <p:nvPr/>
+        </p:nvSpPr>
+        <p:spPr>
+          <a:xfrm>
+            <a:off x="3869483" y="2289399"/>
+            <a:ext cx="558393" cy="246221"/>
+          </a:xfrm>
+          <a:prstGeom prst="rect">
+            <a:avLst/>
+          </a:prstGeom>
+          <a:noFill/>
+        </p:spPr>
+        <p:txBody>
+          <a:bodyPr wrap="square" rtlCol="0">
+            <a:spAutoFit/>
+          </a:bodyPr>
+          <a:lstStyle/>
+          <a:p>
+            <a:r>
+              <a:rPr lang="en-CA" sz="1000" dirty="0"/>
+              <a:t>Patient</a:t>
+            </a:r>
+            <a:endParaRPr lang="en-CA" sz="1000" b="1" dirty="0"/>
+          </a:p>
+        </p:txBody>
+      </p:sp>
+      <p:sp>
+        <p:nvSpPr>
+          <p:cNvPr id="34" name="TextBox 33">
+            <a:extLst>
+              <a:ext uri="{FF2B5EF4-FFF2-40B4-BE49-F238E27FC236}">
+                <a16:creationId xmlns:a16="http://schemas.microsoft.com/office/drawing/2014/main" id="{1B06EC2B-4414-D04C-9BD1-DDE76BC94652}"/>
+              </a:ext>
+            </a:extLst>
+          </p:cNvPr>
+          <p:cNvSpPr txBox="1"/>
+          <p:nvPr/>
+        </p:nvSpPr>
+        <p:spPr>
+          <a:xfrm>
+            <a:off x="2810892" y="2286186"/>
+            <a:ext cx="1071898" cy="246221"/>
+          </a:xfrm>
+          <a:prstGeom prst="rect">
+            <a:avLst/>
+          </a:prstGeom>
+          <a:noFill/>
+        </p:spPr>
+        <p:txBody>
+          <a:bodyPr wrap="square" rtlCol="0">
+            <a:spAutoFit/>
+          </a:bodyPr>
+          <a:lstStyle/>
+          <a:p>
+            <a:r>
+              <a:rPr lang="en-CA" sz="1000" dirty="0"/>
+              <a:t>Service Provider</a:t>
+            </a:r>
+            <a:endParaRPr lang="en-CA" sz="1000" b="1" dirty="0"/>
+          </a:p>
+        </p:txBody>
+      </p:sp>
     </p:spTree>
     <p:extLst>
       <p:ext uri="{BB962C8B-B14F-4D97-AF65-F5344CB8AC3E}">

</xml_diff>